<commit_message>
Formatted opening slide of presentation, and added background information to assessment notebook - identified columns for removal.
</commit_message>
<xml_diff>
--- a/freeform_presentation.pptx
+++ b/freeform_presentation.pptx
@@ -263,7 +263,7 @@
           <a:p>
             <a:fld id="{05EFF64A-EB50-4963-BEE8-EEA90A954A85}" type="datetimeFigureOut">
               <a:rPr lang="en-GB" smtClean="0"/>
-              <a:t>09/12/2025</a:t>
+              <a:t>10/12/2025</a:t>
             </a:fld>
             <a:endParaRPr lang="en-GB"/>
           </a:p>
@@ -463,7 +463,7 @@
           <a:p>
             <a:fld id="{05EFF64A-EB50-4963-BEE8-EEA90A954A85}" type="datetimeFigureOut">
               <a:rPr lang="en-GB" smtClean="0"/>
-              <a:t>09/12/2025</a:t>
+              <a:t>10/12/2025</a:t>
             </a:fld>
             <a:endParaRPr lang="en-GB"/>
           </a:p>
@@ -673,7 +673,7 @@
           <a:p>
             <a:fld id="{05EFF64A-EB50-4963-BEE8-EEA90A954A85}" type="datetimeFigureOut">
               <a:rPr lang="en-GB" smtClean="0"/>
-              <a:t>09/12/2025</a:t>
+              <a:t>10/12/2025</a:t>
             </a:fld>
             <a:endParaRPr lang="en-GB"/>
           </a:p>
@@ -873,7 +873,7 @@
           <a:p>
             <a:fld id="{05EFF64A-EB50-4963-BEE8-EEA90A954A85}" type="datetimeFigureOut">
               <a:rPr lang="en-GB" smtClean="0"/>
-              <a:t>09/12/2025</a:t>
+              <a:t>10/12/2025</a:t>
             </a:fld>
             <a:endParaRPr lang="en-GB"/>
           </a:p>
@@ -1149,7 +1149,7 @@
           <a:p>
             <a:fld id="{05EFF64A-EB50-4963-BEE8-EEA90A954A85}" type="datetimeFigureOut">
               <a:rPr lang="en-GB" smtClean="0"/>
-              <a:t>09/12/2025</a:t>
+              <a:t>10/12/2025</a:t>
             </a:fld>
             <a:endParaRPr lang="en-GB"/>
           </a:p>
@@ -1417,7 +1417,7 @@
           <a:p>
             <a:fld id="{05EFF64A-EB50-4963-BEE8-EEA90A954A85}" type="datetimeFigureOut">
               <a:rPr lang="en-GB" smtClean="0"/>
-              <a:t>09/12/2025</a:t>
+              <a:t>10/12/2025</a:t>
             </a:fld>
             <a:endParaRPr lang="en-GB"/>
           </a:p>
@@ -1832,7 +1832,7 @@
           <a:p>
             <a:fld id="{05EFF64A-EB50-4963-BEE8-EEA90A954A85}" type="datetimeFigureOut">
               <a:rPr lang="en-GB" smtClean="0"/>
-              <a:t>09/12/2025</a:t>
+              <a:t>10/12/2025</a:t>
             </a:fld>
             <a:endParaRPr lang="en-GB"/>
           </a:p>
@@ -1974,7 +1974,7 @@
           <a:p>
             <a:fld id="{05EFF64A-EB50-4963-BEE8-EEA90A954A85}" type="datetimeFigureOut">
               <a:rPr lang="en-GB" smtClean="0"/>
-              <a:t>09/12/2025</a:t>
+              <a:t>10/12/2025</a:t>
             </a:fld>
             <a:endParaRPr lang="en-GB"/>
           </a:p>
@@ -2087,7 +2087,7 @@
           <a:p>
             <a:fld id="{05EFF64A-EB50-4963-BEE8-EEA90A954A85}" type="datetimeFigureOut">
               <a:rPr lang="en-GB" smtClean="0"/>
-              <a:t>09/12/2025</a:t>
+              <a:t>10/12/2025</a:t>
             </a:fld>
             <a:endParaRPr lang="en-GB"/>
           </a:p>
@@ -2400,7 +2400,7 @@
           <a:p>
             <a:fld id="{05EFF64A-EB50-4963-BEE8-EEA90A954A85}" type="datetimeFigureOut">
               <a:rPr lang="en-GB" smtClean="0"/>
-              <a:t>09/12/2025</a:t>
+              <a:t>10/12/2025</a:t>
             </a:fld>
             <a:endParaRPr lang="en-GB"/>
           </a:p>
@@ -2689,7 +2689,7 @@
           <a:p>
             <a:fld id="{05EFF64A-EB50-4963-BEE8-EEA90A954A85}" type="datetimeFigureOut">
               <a:rPr lang="en-GB" smtClean="0"/>
-              <a:t>09/12/2025</a:t>
+              <a:t>10/12/2025</a:t>
             </a:fld>
             <a:endParaRPr lang="en-GB"/>
           </a:p>
@@ -2932,7 +2932,7 @@
           <a:p>
             <a:fld id="{05EFF64A-EB50-4963-BEE8-EEA90A954A85}" type="datetimeFigureOut">
               <a:rPr lang="en-GB" smtClean="0"/>
-              <a:t>09/12/2025</a:t>
+              <a:t>10/12/2025</a:t>
             </a:fld>
             <a:endParaRPr lang="en-GB"/>
           </a:p>
@@ -3349,6 +3349,62 @@
           <a:chExt cx="0" cy="0"/>
         </a:xfrm>
       </p:grpSpPr>
+      <p:pic>
+        <p:nvPicPr>
+          <p:cNvPr id="1034" name="Picture 10" descr="Nottingham Strong: Read Reviews and Book Classes on ClassPass">
+            <a:extLst>
+              <a:ext uri="{FF2B5EF4-FFF2-40B4-BE49-F238E27FC236}">
+                <a16:creationId xmlns:a16="http://schemas.microsoft.com/office/drawing/2014/main" id="{926C5C63-7D78-4FF6-A46B-0C1C0F9F5B7A}"/>
+              </a:ext>
+            </a:extLst>
+          </p:cNvPr>
+          <p:cNvPicPr>
+            <a:picLocks noChangeAspect="1" noChangeArrowheads="1"/>
+          </p:cNvPicPr>
+          <p:nvPr/>
+        </p:nvPicPr>
+        <p:blipFill rotWithShape="1">
+          <a:blip r:embed="rId2">
+            <a:extLst>
+              <a:ext uri="{BEBA8EAE-BF5A-486C-A8C5-ECC9F3942E4B}">
+                <a14:imgProps xmlns:a14="http://schemas.microsoft.com/office/drawing/2010/main">
+                  <a14:imgLayer r:embed="rId3">
+                    <a14:imgEffect>
+                      <a14:artisticBlur radius="6"/>
+                    </a14:imgEffect>
+                  </a14:imgLayer>
+                </a14:imgProps>
+              </a:ext>
+              <a:ext uri="{28A0092B-C50C-407E-A947-70E740481C1C}">
+                <a14:useLocalDpi xmlns:a14="http://schemas.microsoft.com/office/drawing/2010/main" val="0"/>
+              </a:ext>
+            </a:extLst>
+          </a:blip>
+          <a:srcRect t="-1" b="55122"/>
+          <a:stretch>
+            <a:fillRect/>
+          </a:stretch>
+        </p:blipFill>
+        <p:spPr bwMode="auto">
+          <a:xfrm>
+            <a:off x="-217715" y="-106"/>
+            <a:ext cx="13045440" cy="7343881"/>
+          </a:xfrm>
+          <a:prstGeom prst="rect">
+            <a:avLst/>
+          </a:prstGeom>
+          <a:noFill/>
+          <a:extLst>
+            <a:ext uri="{909E8E84-426E-40DD-AFC4-6F175D3DCCD1}">
+              <a14:hiddenFill xmlns:a14="http://schemas.microsoft.com/office/drawing/2010/main">
+                <a:solidFill>
+                  <a:srgbClr val="FFFFFF"/>
+                </a:solidFill>
+              </a14:hiddenFill>
+            </a:ext>
+          </a:extLst>
+        </p:spPr>
+      </p:pic>
       <p:sp>
         <p:nvSpPr>
           <p:cNvPr id="2" name="Title 1">
@@ -3367,11 +3423,18 @@
         </p:nvSpPr>
         <p:spPr/>
         <p:txBody>
-          <a:bodyPr/>
-          <a:lstStyle/>
-          <a:p>
-            <a:r>
-              <a:rPr lang="en-GB" dirty="0"/>
+          <a:bodyPr>
+            <a:normAutofit fontScale="90000"/>
+          </a:bodyPr>
+          <a:lstStyle/>
+          <a:p>
+            <a:r>
+              <a:rPr lang="en-GB" dirty="0">
+                <a:solidFill>
+                  <a:srgbClr val="FF0000"/>
+                </a:solidFill>
+                <a:latin typeface="Arial Black" panose="020B0A04020102020204" pitchFamily="34" charset="0"/>
+              </a:rPr>
               <a:t>Freeform Programming Assessment</a:t>
             </a:r>
           </a:p>
@@ -3398,7 +3461,219 @@
           <a:bodyPr/>
           <a:lstStyle/>
           <a:p>
-            <a:endParaRPr lang="en-GB"/>
+            <a:r>
+              <a:rPr lang="en-GB" dirty="0">
+                <a:solidFill>
+                  <a:srgbClr val="FF0000"/>
+                </a:solidFill>
+                <a:latin typeface="Arial Black" panose="020B0A04020102020204" pitchFamily="34" charset="0"/>
+              </a:rPr>
+              <a:t>Topic - Powerlifting</a:t>
+            </a:r>
+          </a:p>
+        </p:txBody>
+      </p:sp>
+      <p:sp>
+        <p:nvSpPr>
+          <p:cNvPr id="4" name="Subtitle 2">
+            <a:extLst>
+              <a:ext uri="{FF2B5EF4-FFF2-40B4-BE49-F238E27FC236}">
+                <a16:creationId xmlns:a16="http://schemas.microsoft.com/office/drawing/2014/main" id="{A33D4FB6-7CC0-60FD-7E81-1B600193801F}"/>
+              </a:ext>
+            </a:extLst>
+          </p:cNvPr>
+          <p:cNvSpPr txBox="1">
+            <a:spLocks/>
+          </p:cNvSpPr>
+          <p:nvPr/>
+        </p:nvSpPr>
+        <p:spPr>
+          <a:xfrm>
+            <a:off x="-1371600" y="6372225"/>
+            <a:ext cx="6219825" cy="971550"/>
+          </a:xfrm>
+          <a:prstGeom prst="rect">
+            <a:avLst/>
+          </a:prstGeom>
+        </p:spPr>
+        <p:txBody>
+          <a:bodyPr vert="horz" lIns="91440" tIns="45720" rIns="91440" bIns="45720" rtlCol="0">
+            <a:normAutofit/>
+          </a:bodyPr>
+          <a:lstStyle>
+            <a:lvl1pPr marL="0" indent="0" algn="ctr" defTabSz="914400" rtl="0" eaLnBrk="1" latinLnBrk="0" hangingPunct="1">
+              <a:lnSpc>
+                <a:spcPct val="90000"/>
+              </a:lnSpc>
+              <a:spcBef>
+                <a:spcPts val="1000"/>
+              </a:spcBef>
+              <a:buFont typeface="Arial" panose="020B0604020202020204" pitchFamily="34" charset="0"/>
+              <a:buNone/>
+              <a:defRPr sz="2400" kern="1200">
+                <a:solidFill>
+                  <a:schemeClr val="tx1"/>
+                </a:solidFill>
+                <a:latin typeface="+mn-lt"/>
+                <a:ea typeface="+mn-ea"/>
+                <a:cs typeface="+mn-cs"/>
+              </a:defRPr>
+            </a:lvl1pPr>
+            <a:lvl2pPr marL="457200" indent="0" algn="ctr" defTabSz="914400" rtl="0" eaLnBrk="1" latinLnBrk="0" hangingPunct="1">
+              <a:lnSpc>
+                <a:spcPct val="90000"/>
+              </a:lnSpc>
+              <a:spcBef>
+                <a:spcPts val="500"/>
+              </a:spcBef>
+              <a:buFont typeface="Arial" panose="020B0604020202020204" pitchFamily="34" charset="0"/>
+              <a:buNone/>
+              <a:defRPr sz="2000" kern="1200">
+                <a:solidFill>
+                  <a:schemeClr val="tx1"/>
+                </a:solidFill>
+                <a:latin typeface="+mn-lt"/>
+                <a:ea typeface="+mn-ea"/>
+                <a:cs typeface="+mn-cs"/>
+              </a:defRPr>
+            </a:lvl2pPr>
+            <a:lvl3pPr marL="914400" indent="0" algn="ctr" defTabSz="914400" rtl="0" eaLnBrk="1" latinLnBrk="0" hangingPunct="1">
+              <a:lnSpc>
+                <a:spcPct val="90000"/>
+              </a:lnSpc>
+              <a:spcBef>
+                <a:spcPts val="500"/>
+              </a:spcBef>
+              <a:buFont typeface="Arial" panose="020B0604020202020204" pitchFamily="34" charset="0"/>
+              <a:buNone/>
+              <a:defRPr sz="1800" kern="1200">
+                <a:solidFill>
+                  <a:schemeClr val="tx1"/>
+                </a:solidFill>
+                <a:latin typeface="+mn-lt"/>
+                <a:ea typeface="+mn-ea"/>
+                <a:cs typeface="+mn-cs"/>
+              </a:defRPr>
+            </a:lvl3pPr>
+            <a:lvl4pPr marL="1371600" indent="0" algn="ctr" defTabSz="914400" rtl="0" eaLnBrk="1" latinLnBrk="0" hangingPunct="1">
+              <a:lnSpc>
+                <a:spcPct val="90000"/>
+              </a:lnSpc>
+              <a:spcBef>
+                <a:spcPts val="500"/>
+              </a:spcBef>
+              <a:buFont typeface="Arial" panose="020B0604020202020204" pitchFamily="34" charset="0"/>
+              <a:buNone/>
+              <a:defRPr sz="1600" kern="1200">
+                <a:solidFill>
+                  <a:schemeClr val="tx1"/>
+                </a:solidFill>
+                <a:latin typeface="+mn-lt"/>
+                <a:ea typeface="+mn-ea"/>
+                <a:cs typeface="+mn-cs"/>
+              </a:defRPr>
+            </a:lvl4pPr>
+            <a:lvl5pPr marL="1828800" indent="0" algn="ctr" defTabSz="914400" rtl="0" eaLnBrk="1" latinLnBrk="0" hangingPunct="1">
+              <a:lnSpc>
+                <a:spcPct val="90000"/>
+              </a:lnSpc>
+              <a:spcBef>
+                <a:spcPts val="500"/>
+              </a:spcBef>
+              <a:buFont typeface="Arial" panose="020B0604020202020204" pitchFamily="34" charset="0"/>
+              <a:buNone/>
+              <a:defRPr sz="1600" kern="1200">
+                <a:solidFill>
+                  <a:schemeClr val="tx1"/>
+                </a:solidFill>
+                <a:latin typeface="+mn-lt"/>
+                <a:ea typeface="+mn-ea"/>
+                <a:cs typeface="+mn-cs"/>
+              </a:defRPr>
+            </a:lvl5pPr>
+            <a:lvl6pPr marL="2286000" indent="0" algn="ctr" defTabSz="914400" rtl="0" eaLnBrk="1" latinLnBrk="0" hangingPunct="1">
+              <a:lnSpc>
+                <a:spcPct val="90000"/>
+              </a:lnSpc>
+              <a:spcBef>
+                <a:spcPts val="500"/>
+              </a:spcBef>
+              <a:buFont typeface="Arial" panose="020B0604020202020204" pitchFamily="34" charset="0"/>
+              <a:buNone/>
+              <a:defRPr sz="1600" kern="1200">
+                <a:solidFill>
+                  <a:schemeClr val="tx1"/>
+                </a:solidFill>
+                <a:latin typeface="+mn-lt"/>
+                <a:ea typeface="+mn-ea"/>
+                <a:cs typeface="+mn-cs"/>
+              </a:defRPr>
+            </a:lvl6pPr>
+            <a:lvl7pPr marL="2743200" indent="0" algn="ctr" defTabSz="914400" rtl="0" eaLnBrk="1" latinLnBrk="0" hangingPunct="1">
+              <a:lnSpc>
+                <a:spcPct val="90000"/>
+              </a:lnSpc>
+              <a:spcBef>
+                <a:spcPts val="500"/>
+              </a:spcBef>
+              <a:buFont typeface="Arial" panose="020B0604020202020204" pitchFamily="34" charset="0"/>
+              <a:buNone/>
+              <a:defRPr sz="1600" kern="1200">
+                <a:solidFill>
+                  <a:schemeClr val="tx1"/>
+                </a:solidFill>
+                <a:latin typeface="+mn-lt"/>
+                <a:ea typeface="+mn-ea"/>
+                <a:cs typeface="+mn-cs"/>
+              </a:defRPr>
+            </a:lvl7pPr>
+            <a:lvl8pPr marL="3200400" indent="0" algn="ctr" defTabSz="914400" rtl="0" eaLnBrk="1" latinLnBrk="0" hangingPunct="1">
+              <a:lnSpc>
+                <a:spcPct val="90000"/>
+              </a:lnSpc>
+              <a:spcBef>
+                <a:spcPts val="500"/>
+              </a:spcBef>
+              <a:buFont typeface="Arial" panose="020B0604020202020204" pitchFamily="34" charset="0"/>
+              <a:buNone/>
+              <a:defRPr sz="1600" kern="1200">
+                <a:solidFill>
+                  <a:schemeClr val="tx1"/>
+                </a:solidFill>
+                <a:latin typeface="+mn-lt"/>
+                <a:ea typeface="+mn-ea"/>
+                <a:cs typeface="+mn-cs"/>
+              </a:defRPr>
+            </a:lvl8pPr>
+            <a:lvl9pPr marL="3657600" indent="0" algn="ctr" defTabSz="914400" rtl="0" eaLnBrk="1" latinLnBrk="0" hangingPunct="1">
+              <a:lnSpc>
+                <a:spcPct val="90000"/>
+              </a:lnSpc>
+              <a:spcBef>
+                <a:spcPts val="500"/>
+              </a:spcBef>
+              <a:buFont typeface="Arial" panose="020B0604020202020204" pitchFamily="34" charset="0"/>
+              <a:buNone/>
+              <a:defRPr sz="1600" kern="1200">
+                <a:solidFill>
+                  <a:schemeClr val="tx1"/>
+                </a:solidFill>
+                <a:latin typeface="+mn-lt"/>
+                <a:ea typeface="+mn-ea"/>
+                <a:cs typeface="+mn-cs"/>
+              </a:defRPr>
+            </a:lvl9pPr>
+          </a:lstStyle>
+          <a:p>
+            <a:r>
+              <a:rPr lang="en-GB" sz="1800" dirty="0">
+                <a:solidFill>
+                  <a:srgbClr val="FF0000"/>
+                </a:solidFill>
+                <a:latin typeface="Arial Black" panose="020B0A04020102020204" pitchFamily="34" charset="0"/>
+              </a:rPr>
+              <a:t>Photo: Nottingham Strong</a:t>
+            </a:r>
           </a:p>
         </p:txBody>
       </p:sp>

</xml_diff>